<commit_message>
Add spawn enemies & Add colide
0613 Upload.
spawn enemies (normal, speed, gun, shield)
colide player with enemies / enemies with bullet

Todo: make Rpg's bomb.  gun enemy shot to player.
code rearrange.
</commit_message>
<xml_diff>
--- a/FinalProject/Image/image.pptx
+++ b/FinalProject/Image/image.pptx
@@ -3338,6 +3338,14 @@
 <file path=ppt/slides/slide1.xml><?xml version="1.0" encoding="utf-8"?>
 <p:sld xmlns:a="http://schemas.openxmlformats.org/drawingml/2006/main" xmlns:r="http://schemas.openxmlformats.org/officeDocument/2006/relationships" xmlns:p="http://schemas.openxmlformats.org/presentationml/2006/main">
   <p:cSld>
+    <p:bg>
+      <p:bgPr>
+        <a:solidFill>
+          <a:schemeClr val="bg2"/>
+        </a:solidFill>
+        <a:effectLst/>
+      </p:bgPr>
+    </p:bg>
     <p:spTree>
       <p:nvGrpSpPr>
         <p:cNvPr id="1" name=""/>
@@ -3464,6 +3472,7 @@
           <a:prstGeom prst="ellipse">
             <a:avLst/>
           </a:prstGeom>
+          <a:noFill/>
           <a:ln>
             <a:solidFill>
               <a:schemeClr val="accent4">

</xml_diff>

<commit_message>
Add Sound, Sword, Pause, Record, GunEnemy, PlayerDie, Weapon cool
Last Algorithm Update. (Complete game)

Add Sound (BGM, Effect)
Update Sword structure
Add Pause system (ESC key)
Add Recording system.
Update GunEnemy (now, can shoot bullet for player)
Add PlayerDie (when die, esc to menu)
Add Showing Weapon cool.

Todo : Make PPT, Comment.
</commit_message>
<xml_diff>
--- a/FinalProject/Image/image.pptx
+++ b/FinalProject/Image/image.pptx
@@ -285,7 +285,7 @@
           <a:p>
             <a:fld id="{CCFCC741-64DC-4DDB-A1BB-54EA40CC502E}" type="datetimeFigureOut">
               <a:rPr lang="ko-KR" altLang="en-US" smtClean="0"/>
-              <a:t>2021-06-13</a:t>
+              <a:t>2021-06-20</a:t>
             </a:fld>
             <a:endParaRPr lang="ko-KR" altLang="en-US"/>
           </a:p>
@@ -483,7 +483,7 @@
           <a:p>
             <a:fld id="{CCFCC741-64DC-4DDB-A1BB-54EA40CC502E}" type="datetimeFigureOut">
               <a:rPr lang="ko-KR" altLang="en-US" smtClean="0"/>
-              <a:t>2021-06-13</a:t>
+              <a:t>2021-06-20</a:t>
             </a:fld>
             <a:endParaRPr lang="ko-KR" altLang="en-US"/>
           </a:p>
@@ -691,7 +691,7 @@
           <a:p>
             <a:fld id="{CCFCC741-64DC-4DDB-A1BB-54EA40CC502E}" type="datetimeFigureOut">
               <a:rPr lang="ko-KR" altLang="en-US" smtClean="0"/>
-              <a:t>2021-06-13</a:t>
+              <a:t>2021-06-20</a:t>
             </a:fld>
             <a:endParaRPr lang="ko-KR" altLang="en-US"/>
           </a:p>
@@ -889,7 +889,7 @@
           <a:p>
             <a:fld id="{CCFCC741-64DC-4DDB-A1BB-54EA40CC502E}" type="datetimeFigureOut">
               <a:rPr lang="ko-KR" altLang="en-US" smtClean="0"/>
-              <a:t>2021-06-13</a:t>
+              <a:t>2021-06-20</a:t>
             </a:fld>
             <a:endParaRPr lang="ko-KR" altLang="en-US"/>
           </a:p>
@@ -1164,7 +1164,7 @@
           <a:p>
             <a:fld id="{CCFCC741-64DC-4DDB-A1BB-54EA40CC502E}" type="datetimeFigureOut">
               <a:rPr lang="ko-KR" altLang="en-US" smtClean="0"/>
-              <a:t>2021-06-13</a:t>
+              <a:t>2021-06-20</a:t>
             </a:fld>
             <a:endParaRPr lang="ko-KR" altLang="en-US"/>
           </a:p>
@@ -1429,7 +1429,7 @@
           <a:p>
             <a:fld id="{CCFCC741-64DC-4DDB-A1BB-54EA40CC502E}" type="datetimeFigureOut">
               <a:rPr lang="ko-KR" altLang="en-US" smtClean="0"/>
-              <a:t>2021-06-13</a:t>
+              <a:t>2021-06-20</a:t>
             </a:fld>
             <a:endParaRPr lang="ko-KR" altLang="en-US"/>
           </a:p>
@@ -1841,7 +1841,7 @@
           <a:p>
             <a:fld id="{CCFCC741-64DC-4DDB-A1BB-54EA40CC502E}" type="datetimeFigureOut">
               <a:rPr lang="ko-KR" altLang="en-US" smtClean="0"/>
-              <a:t>2021-06-13</a:t>
+              <a:t>2021-06-20</a:t>
             </a:fld>
             <a:endParaRPr lang="ko-KR" altLang="en-US"/>
           </a:p>
@@ -1982,7 +1982,7 @@
           <a:p>
             <a:fld id="{CCFCC741-64DC-4DDB-A1BB-54EA40CC502E}" type="datetimeFigureOut">
               <a:rPr lang="ko-KR" altLang="en-US" smtClean="0"/>
-              <a:t>2021-06-13</a:t>
+              <a:t>2021-06-20</a:t>
             </a:fld>
             <a:endParaRPr lang="ko-KR" altLang="en-US"/>
           </a:p>
@@ -2095,7 +2095,7 @@
           <a:p>
             <a:fld id="{CCFCC741-64DC-4DDB-A1BB-54EA40CC502E}" type="datetimeFigureOut">
               <a:rPr lang="ko-KR" altLang="en-US" smtClean="0"/>
-              <a:t>2021-06-13</a:t>
+              <a:t>2021-06-20</a:t>
             </a:fld>
             <a:endParaRPr lang="ko-KR" altLang="en-US"/>
           </a:p>
@@ -2406,7 +2406,7 @@
           <a:p>
             <a:fld id="{CCFCC741-64DC-4DDB-A1BB-54EA40CC502E}" type="datetimeFigureOut">
               <a:rPr lang="ko-KR" altLang="en-US" smtClean="0"/>
-              <a:t>2021-06-13</a:t>
+              <a:t>2021-06-20</a:t>
             </a:fld>
             <a:endParaRPr lang="ko-KR" altLang="en-US"/>
           </a:p>
@@ -2694,7 +2694,7 @@
           <a:p>
             <a:fld id="{CCFCC741-64DC-4DDB-A1BB-54EA40CC502E}" type="datetimeFigureOut">
               <a:rPr lang="ko-KR" altLang="en-US" smtClean="0"/>
-              <a:t>2021-06-13</a:t>
+              <a:t>2021-06-20</a:t>
             </a:fld>
             <a:endParaRPr lang="ko-KR" altLang="en-US"/>
           </a:p>
@@ -2935,7 +2935,7 @@
           <a:p>
             <a:fld id="{CCFCC741-64DC-4DDB-A1BB-54EA40CC502E}" type="datetimeFigureOut">
               <a:rPr lang="ko-KR" altLang="en-US" smtClean="0"/>
-              <a:t>2021-06-13</a:t>
+              <a:t>2021-06-20</a:t>
             </a:fld>
             <a:endParaRPr lang="ko-KR" altLang="en-US"/>
           </a:p>
@@ -3422,7 +3422,7 @@
         </p:nvSpPr>
         <p:spPr>
           <a:xfrm>
-            <a:off x="3479801" y="3208868"/>
+            <a:off x="3463132" y="3168386"/>
             <a:ext cx="149224" cy="198701"/>
           </a:xfrm>
           <a:prstGeom prst="ellipse">
@@ -3667,6 +3667,53 @@
           </p:txBody>
         </p:sp>
       </p:grpSp>
+      <p:sp>
+        <p:nvSpPr>
+          <p:cNvPr id="10" name="타원 9">
+            <a:extLst>
+              <a:ext uri="{FF2B5EF4-FFF2-40B4-BE49-F238E27FC236}">
+                <a16:creationId xmlns:a16="http://schemas.microsoft.com/office/drawing/2014/main" id="{F3BC6B45-978D-41A7-AD1E-554A8072231B}"/>
+              </a:ext>
+            </a:extLst>
+          </p:cNvPr>
+          <p:cNvSpPr/>
+          <p:nvPr/>
+        </p:nvSpPr>
+        <p:spPr>
+          <a:xfrm>
+            <a:off x="3836989" y="3213629"/>
+            <a:ext cx="149224" cy="198701"/>
+          </a:xfrm>
+          <a:prstGeom prst="ellipse">
+            <a:avLst/>
+          </a:prstGeom>
+          <a:solidFill>
+            <a:srgbClr val="FF0000"/>
+          </a:solidFill>
+        </p:spPr>
+        <p:style>
+          <a:lnRef idx="3">
+            <a:schemeClr val="lt1"/>
+          </a:lnRef>
+          <a:fillRef idx="1">
+            <a:schemeClr val="accent4"/>
+          </a:fillRef>
+          <a:effectRef idx="1">
+            <a:schemeClr val="accent4"/>
+          </a:effectRef>
+          <a:fontRef idx="minor">
+            <a:schemeClr val="lt1"/>
+          </a:fontRef>
+        </p:style>
+        <p:txBody>
+          <a:bodyPr rtlCol="0" anchor="ctr"/>
+          <a:lstStyle/>
+          <a:p>
+            <a:pPr algn="ctr"/>
+            <a:endParaRPr lang="ko-KR" altLang="en-US" dirty="0"/>
+          </a:p>
+        </p:txBody>
+      </p:sp>
     </p:spTree>
     <p:extLst>
       <p:ext uri="{BB962C8B-B14F-4D97-AF65-F5344CB8AC3E}">

</xml_diff>